<commit_message>
Fix loop bounds in overview figure
</commit_message>
<xml_diff>
--- a/docs/MICRO 2022/figures/OverviewExample.pptx
+++ b/docs/MICRO 2022/figures/OverviewExample.pptx
@@ -197,7 +197,7 @@
           <a:p>
             <a:fld id="{B2A72FD5-2455-44B4-BA8F-3CE7C1FDCBEA}" type="datetimeFigureOut">
               <a:rPr lang="en-IN" smtClean="0"/>
-              <a:t>16-04-2022</a:t>
+              <a:t>18-04-2022</a:t>
             </a:fld>
             <a:endParaRPr lang="en-IN"/>
           </a:p>
@@ -596,7 +596,7 @@
           <a:p>
             <a:fld id="{3D486654-0AA5-412D-8B84-E4540972BFBD}" type="datetimeFigureOut">
               <a:rPr lang="en-IN" smtClean="0"/>
-              <a:t>16-04-2022</a:t>
+              <a:t>18-04-2022</a:t>
             </a:fld>
             <a:endParaRPr lang="en-IN"/>
           </a:p>
@@ -766,7 +766,7 @@
           <a:p>
             <a:fld id="{3D486654-0AA5-412D-8B84-E4540972BFBD}" type="datetimeFigureOut">
               <a:rPr lang="en-IN" smtClean="0"/>
-              <a:t>16-04-2022</a:t>
+              <a:t>18-04-2022</a:t>
             </a:fld>
             <a:endParaRPr lang="en-IN"/>
           </a:p>
@@ -946,7 +946,7 @@
           <a:p>
             <a:fld id="{3D486654-0AA5-412D-8B84-E4540972BFBD}" type="datetimeFigureOut">
               <a:rPr lang="en-IN" smtClean="0"/>
-              <a:t>16-04-2022</a:t>
+              <a:t>18-04-2022</a:t>
             </a:fld>
             <a:endParaRPr lang="en-IN"/>
           </a:p>
@@ -1116,7 +1116,7 @@
           <a:p>
             <a:fld id="{3D486654-0AA5-412D-8B84-E4540972BFBD}" type="datetimeFigureOut">
               <a:rPr lang="en-IN" smtClean="0"/>
-              <a:t>16-04-2022</a:t>
+              <a:t>18-04-2022</a:t>
             </a:fld>
             <a:endParaRPr lang="en-IN"/>
           </a:p>
@@ -1360,7 +1360,7 @@
           <a:p>
             <a:fld id="{3D486654-0AA5-412D-8B84-E4540972BFBD}" type="datetimeFigureOut">
               <a:rPr lang="en-IN" smtClean="0"/>
-              <a:t>16-04-2022</a:t>
+              <a:t>18-04-2022</a:t>
             </a:fld>
             <a:endParaRPr lang="en-IN"/>
           </a:p>
@@ -1592,7 +1592,7 @@
           <a:p>
             <a:fld id="{3D486654-0AA5-412D-8B84-E4540972BFBD}" type="datetimeFigureOut">
               <a:rPr lang="en-IN" smtClean="0"/>
-              <a:t>16-04-2022</a:t>
+              <a:t>18-04-2022</a:t>
             </a:fld>
             <a:endParaRPr lang="en-IN"/>
           </a:p>
@@ -1959,7 +1959,7 @@
           <a:p>
             <a:fld id="{3D486654-0AA5-412D-8B84-E4540972BFBD}" type="datetimeFigureOut">
               <a:rPr lang="en-IN" smtClean="0"/>
-              <a:t>16-04-2022</a:t>
+              <a:t>18-04-2022</a:t>
             </a:fld>
             <a:endParaRPr lang="en-IN"/>
           </a:p>
@@ -2077,7 +2077,7 @@
           <a:p>
             <a:fld id="{3D486654-0AA5-412D-8B84-E4540972BFBD}" type="datetimeFigureOut">
               <a:rPr lang="en-IN" smtClean="0"/>
-              <a:t>16-04-2022</a:t>
+              <a:t>18-04-2022</a:t>
             </a:fld>
             <a:endParaRPr lang="en-IN"/>
           </a:p>
@@ -2172,7 +2172,7 @@
           <a:p>
             <a:fld id="{3D486654-0AA5-412D-8B84-E4540972BFBD}" type="datetimeFigureOut">
               <a:rPr lang="en-IN" smtClean="0"/>
-              <a:t>16-04-2022</a:t>
+              <a:t>18-04-2022</a:t>
             </a:fld>
             <a:endParaRPr lang="en-IN"/>
           </a:p>
@@ -2449,7 +2449,7 @@
           <a:p>
             <a:fld id="{3D486654-0AA5-412D-8B84-E4540972BFBD}" type="datetimeFigureOut">
               <a:rPr lang="en-IN" smtClean="0"/>
-              <a:t>16-04-2022</a:t>
+              <a:t>18-04-2022</a:t>
             </a:fld>
             <a:endParaRPr lang="en-IN"/>
           </a:p>
@@ -2706,7 +2706,7 @@
           <a:p>
             <a:fld id="{3D486654-0AA5-412D-8B84-E4540972BFBD}" type="datetimeFigureOut">
               <a:rPr lang="en-IN" smtClean="0"/>
-              <a:t>16-04-2022</a:t>
+              <a:t>18-04-2022</a:t>
             </a:fld>
             <a:endParaRPr lang="en-IN"/>
           </a:p>
@@ -2919,7 +2919,7 @@
           <a:p>
             <a:fld id="{3D486654-0AA5-412D-8B84-E4540972BFBD}" type="datetimeFigureOut">
               <a:rPr lang="en-IN" smtClean="0"/>
-              <a:t>16-04-2022</a:t>
+              <a:t>18-04-2022</a:t>
             </a:fld>
             <a:endParaRPr lang="en-IN"/>
           </a:p>
@@ -7786,7 +7786,7 @@
                   <a:schemeClr val="tx1"/>
                 </a:solidFill>
               </a:rPr>
-              <a:t> t = 0 to 1 </a:t>
+              <a:t> t = 0 to 2 </a:t>
             </a:r>
             <a:r>
               <a:rPr lang="en-IN" sz="495" b="1" dirty="0">
@@ -7949,7 +7949,7 @@
                   <a:schemeClr val="tx1"/>
                 </a:solidFill>
               </a:rPr>
-              <a:t> t = 1 to 3 step 1 {</a:t>
+              <a:t> t = 2 to 3 step 1 {</a:t>
             </a:r>
           </a:p>
           <a:p>
@@ -8167,7 +8167,7 @@
                   <a:schemeClr val="tx1"/>
                 </a:solidFill>
               </a:rPr>
-              <a:t> t = 0 to 1 </a:t>
+              <a:t> t = 0 to 2 </a:t>
             </a:r>
             <a:r>
               <a:rPr lang="en-IN" sz="495" b="1" dirty="0">
@@ -8438,7 +8438,7 @@
                   <a:schemeClr val="tx1"/>
                 </a:solidFill>
               </a:rPr>
-              <a:t> t = 1 to 3 </a:t>
+              <a:t> t = 2 to 3 </a:t>
             </a:r>
             <a:r>
               <a:rPr lang="en-IN" sz="495" b="1" dirty="0">
@@ -9001,7 +9001,7 @@
                   <a:schemeClr val="tx1"/>
                 </a:solidFill>
               </a:rPr>
-              <a:t> t = 0 to 1 </a:t>
+              <a:t> t = 0 to 2 </a:t>
             </a:r>
             <a:r>
               <a:rPr lang="en-IN" sz="495" b="1" dirty="0">
@@ -9328,7 +9328,23 @@
                   <a:schemeClr val="tx1"/>
                 </a:solidFill>
               </a:rPr>
-              <a:t> t = 1 to 3 </a:t>
+              <a:t> t </a:t>
+            </a:r>
+            <a:r>
+              <a:rPr lang="en-IN" sz="495">
+                <a:solidFill>
+                  <a:schemeClr val="tx1"/>
+                </a:solidFill>
+              </a:rPr>
+              <a:t>= 2 </a:t>
+            </a:r>
+            <a:r>
+              <a:rPr lang="en-IN" sz="495" dirty="0">
+                <a:solidFill>
+                  <a:schemeClr val="tx1"/>
+                </a:solidFill>
+              </a:rPr>
+              <a:t>to 3 </a:t>
             </a:r>
             <a:r>
               <a:rPr lang="en-IN" sz="495" b="1" dirty="0">

</xml_diff>